<commit_message>
Background picture inside table cells
</commit_message>
<xml_diff>
--- a/PptxTemplater.Tests/files/SetTableCellBackgroundPicture.pptx
+++ b/PptxTemplater.Tests/files/SetTableCellBackgroundPicture.pptx
@@ -3105,7 +3105,7 @@
             <p:ph idx="1"/>
             <p:extLst>
               <p:ext uri="{D42A27DB-BD31-4B8C-83A1-F6EECF244321}">
-                <p14:modId xmlns:p14="http://schemas.microsoft.com/office/powerpoint/2010/main" val="4161916735"/>
+                <p14:modId xmlns:p14="http://schemas.microsoft.com/office/powerpoint/2010/main" val="223141594"/>
               </p:ext>
             </p:extLst>
           </p:nvPr>
@@ -3133,47 +3133,67 @@
                     <a:bodyPr/>
                     <a:lstStyle/>
                     <a:p>
-                      <a:endParaRPr lang="fr-FR" dirty="0"/>
-                    </a:p>
-                  </a:txBody>
-                  <a:tcPr/>
-                </a:tc>
-                <a:tc>
-                  <a:txBody>
-                    <a:bodyPr/>
-                    <a:lstStyle/>
-                    <a:p>
-                      <a:endParaRPr lang="fr-FR"/>
-                    </a:p>
-                  </a:txBody>
-                  <a:tcPr/>
-                </a:tc>
-                <a:tc>
-                  <a:txBody>
-                    <a:bodyPr/>
-                    <a:lstStyle/>
-                    <a:p>
-                      <a:endParaRPr lang="fr-FR"/>
-                    </a:p>
-                  </a:txBody>
-                  <a:tcPr/>
-                </a:tc>
-                <a:tc>
-                  <a:txBody>
-                    <a:bodyPr/>
-                    <a:lstStyle/>
-                    <a:p>
-                      <a:endParaRPr lang="fr-FR"/>
-                    </a:p>
-                  </a:txBody>
-                  <a:tcPr/>
-                </a:tc>
-                <a:tc>
-                  <a:txBody>
-                    <a:bodyPr/>
-                    <a:lstStyle/>
-                    <a:p>
-                      <a:endParaRPr lang="fr-FR"/>
+                      <a:r>
+                        <a:rPr lang="en-US" dirty="0" smtClean="0"/>
+                        <a:t>Col0</a:t>
+                      </a:r>
+                      <a:endParaRPr lang="fr-FR" dirty="0"/>
+                    </a:p>
+                  </a:txBody>
+                  <a:tcPr/>
+                </a:tc>
+                <a:tc>
+                  <a:txBody>
+                    <a:bodyPr/>
+                    <a:lstStyle/>
+                    <a:p>
+                      <a:r>
+                        <a:rPr lang="en-US" dirty="0" smtClean="0"/>
+                        <a:t>Col1</a:t>
+                      </a:r>
+                      <a:endParaRPr lang="fr-FR" dirty="0"/>
+                    </a:p>
+                  </a:txBody>
+                  <a:tcPr/>
+                </a:tc>
+                <a:tc>
+                  <a:txBody>
+                    <a:bodyPr/>
+                    <a:lstStyle/>
+                    <a:p>
+                      <a:r>
+                        <a:rPr lang="en-US" dirty="0" smtClean="0"/>
+                        <a:t>Col2</a:t>
+                      </a:r>
+                      <a:endParaRPr lang="fr-FR" dirty="0"/>
+                    </a:p>
+                  </a:txBody>
+                  <a:tcPr/>
+                </a:tc>
+                <a:tc>
+                  <a:txBody>
+                    <a:bodyPr/>
+                    <a:lstStyle/>
+                    <a:p>
+                      <a:r>
+                        <a:rPr lang="en-US" dirty="0" smtClean="0"/>
+                        <a:t>Col3</a:t>
+                      </a:r>
+                      <a:endParaRPr lang="fr-FR" dirty="0"/>
+                    </a:p>
+                  </a:txBody>
+                  <a:tcPr/>
+                </a:tc>
+                <a:tc>
+                  <a:txBody>
+                    <a:bodyPr/>
+                    <a:lstStyle/>
+                    <a:p>
+                      <a:r>
+                        <a:rPr lang="en-US" dirty="0" smtClean="0"/>
+                        <a:t>Col4</a:t>
+                      </a:r>
+                      <a:endParaRPr lang="fr-FR" dirty="0"/>
                     </a:p>
                   </a:txBody>
                   <a:tcPr/>
@@ -3187,7 +3207,11 @@
                     <a:p>
                       <a:r>
                         <a:rPr lang="en-US" dirty="0" smtClean="0"/>
-                        <a:t>{{cell1}}</a:t>
+                        <a:t>{{</a:t>
+                      </a:r>
+                      <a:r>
+                        <a:rPr lang="en-US" dirty="0" smtClean="0"/>
+                        <a:t>cell0.0}}</a:t>
                       </a:r>
                       <a:endParaRPr lang="fr-FR" dirty="0"/>
                     </a:p>
@@ -3213,27 +3237,56 @@
                     <a:bodyPr/>
                     <a:lstStyle/>
                     <a:p>
-                      <a:endParaRPr lang="fr-FR" dirty="0"/>
-                    </a:p>
-                  </a:txBody>
-                  <a:tcPr/>
-                </a:tc>
-                <a:tc>
-                  <a:txBody>
-                    <a:bodyPr/>
-                    <a:lstStyle/>
-                    <a:p>
-                      <a:endParaRPr lang="fr-FR"/>
-                    </a:p>
-                  </a:txBody>
-                  <a:tcPr/>
-                </a:tc>
-                <a:tc>
-                  <a:txBody>
-                    <a:bodyPr/>
-                    <a:lstStyle/>
-                    <a:p>
-                      <a:endParaRPr lang="fr-FR"/>
+                      <a:pPr marL="0" marR="0" indent="0" algn="l" defTabSz="914400" rtl="0" eaLnBrk="1" fontAlgn="auto" latinLnBrk="0" hangingPunct="1">
+                        <a:lnSpc>
+                          <a:spcPct val="100000"/>
+                        </a:lnSpc>
+                        <a:spcBef>
+                          <a:spcPts val="0"/>
+                        </a:spcBef>
+                        <a:spcAft>
+                          <a:spcPts val="0"/>
+                        </a:spcAft>
+                        <a:buClrTx/>
+                        <a:buSzTx/>
+                        <a:buFontTx/>
+                        <a:buNone/>
+                        <a:tabLst/>
+                        <a:defRPr/>
+                      </a:pPr>
+                      <a:r>
+                        <a:rPr lang="en-US" dirty="0" smtClean="0"/>
+                        <a:t>{{cell2.0}}</a:t>
+                      </a:r>
+                      <a:endParaRPr lang="fr-FR" dirty="0" smtClean="0"/>
+                    </a:p>
+                  </a:txBody>
+                  <a:tcPr/>
+                </a:tc>
+                <a:tc>
+                  <a:txBody>
+                    <a:bodyPr/>
+                    <a:lstStyle/>
+                    <a:p>
+                      <a:r>
+                        <a:rPr lang="en-US" dirty="0" smtClean="0"/>
+                        <a:t>{{cell3.0}}</a:t>
+                      </a:r>
+                      <a:endParaRPr lang="fr-FR" dirty="0"/>
+                    </a:p>
+                  </a:txBody>
+                  <a:tcPr/>
+                </a:tc>
+                <a:tc>
+                  <a:txBody>
+                    <a:bodyPr/>
+                    <a:lstStyle/>
+                    <a:p>
+                      <a:r>
+                        <a:rPr lang="en-US" dirty="0" smtClean="0"/>
+                        <a:t>{{cell4.0}}</a:t>
+                      </a:r>
+                      <a:endParaRPr lang="fr-FR" dirty="0"/>
                     </a:p>
                   </a:txBody>
                   <a:tcPr/>
@@ -3247,7 +3300,11 @@
                     <a:p>
                       <a:r>
                         <a:rPr lang="en-US" dirty="0" smtClean="0"/>
-                        <a:t>{{cell2}}</a:t>
+                        <a:t>{{</a:t>
+                      </a:r>
+                      <a:r>
+                        <a:rPr lang="en-US" dirty="0" smtClean="0"/>
+                        <a:t>cell0.1}}</a:t>
                       </a:r>
                       <a:endParaRPr lang="fr-FR" dirty="0"/>
                     </a:p>
@@ -3273,27 +3330,39 @@
                     <a:bodyPr/>
                     <a:lstStyle/>
                     <a:p>
-                      <a:endParaRPr lang="fr-FR"/>
-                    </a:p>
-                  </a:txBody>
-                  <a:tcPr/>
-                </a:tc>
-                <a:tc>
-                  <a:txBody>
-                    <a:bodyPr/>
-                    <a:lstStyle/>
-                    <a:p>
-                      <a:endParaRPr lang="fr-FR"/>
-                    </a:p>
-                  </a:txBody>
-                  <a:tcPr/>
-                </a:tc>
-                <a:tc>
-                  <a:txBody>
-                    <a:bodyPr/>
-                    <a:lstStyle/>
-                    <a:p>
-                      <a:endParaRPr lang="fr-FR"/>
+                      <a:r>
+                        <a:rPr lang="en-US" dirty="0" smtClean="0"/>
+                        <a:t>{{cell2.1}}</a:t>
+                      </a:r>
+                      <a:endParaRPr lang="fr-FR" dirty="0"/>
+                    </a:p>
+                  </a:txBody>
+                  <a:tcPr/>
+                </a:tc>
+                <a:tc>
+                  <a:txBody>
+                    <a:bodyPr/>
+                    <a:lstStyle/>
+                    <a:p>
+                      <a:r>
+                        <a:rPr lang="en-US" dirty="0" smtClean="0"/>
+                        <a:t>{{cell3.1}}</a:t>
+                      </a:r>
+                      <a:endParaRPr lang="fr-FR" dirty="0"/>
+                    </a:p>
+                  </a:txBody>
+                  <a:tcPr/>
+                </a:tc>
+                <a:tc>
+                  <a:txBody>
+                    <a:bodyPr/>
+                    <a:lstStyle/>
+                    <a:p>
+                      <a:r>
+                        <a:rPr lang="en-US" dirty="0" smtClean="0"/>
+                        <a:t>{{cell4.1}}</a:t>
+                      </a:r>
+                      <a:endParaRPr lang="fr-FR" dirty="0"/>
                     </a:p>
                   </a:txBody>
                   <a:tcPr/>
@@ -3307,7 +3376,11 @@
                     <a:p>
                       <a:r>
                         <a:rPr lang="en-US" dirty="0" smtClean="0"/>
-                        <a:t>Cell3</a:t>
+                        <a:t>{{</a:t>
+                      </a:r>
+                      <a:r>
+                        <a:rPr lang="en-US" dirty="0" smtClean="0"/>
+                        <a:t>cell0.2}}</a:t>
                       </a:r>
                       <a:endParaRPr lang="fr-FR" dirty="0"/>
                     </a:p>
@@ -3333,27 +3406,39 @@
                     <a:bodyPr/>
                     <a:lstStyle/>
                     <a:p>
-                      <a:endParaRPr lang="fr-FR"/>
-                    </a:p>
-                  </a:txBody>
-                  <a:tcPr/>
-                </a:tc>
-                <a:tc>
-                  <a:txBody>
-                    <a:bodyPr/>
-                    <a:lstStyle/>
-                    <a:p>
-                      <a:endParaRPr lang="fr-FR"/>
-                    </a:p>
-                  </a:txBody>
-                  <a:tcPr/>
-                </a:tc>
-                <a:tc>
-                  <a:txBody>
-                    <a:bodyPr/>
-                    <a:lstStyle/>
-                    <a:p>
-                      <a:endParaRPr lang="fr-FR"/>
+                      <a:r>
+                        <a:rPr lang="en-US" dirty="0" smtClean="0"/>
+                        <a:t>{{cell2.2}}</a:t>
+                      </a:r>
+                      <a:endParaRPr lang="fr-FR" dirty="0"/>
+                    </a:p>
+                  </a:txBody>
+                  <a:tcPr/>
+                </a:tc>
+                <a:tc>
+                  <a:txBody>
+                    <a:bodyPr/>
+                    <a:lstStyle/>
+                    <a:p>
+                      <a:r>
+                        <a:rPr lang="en-US" dirty="0" smtClean="0"/>
+                        <a:t>{{cell3.2}}</a:t>
+                      </a:r>
+                      <a:endParaRPr lang="fr-FR" dirty="0"/>
+                    </a:p>
+                  </a:txBody>
+                  <a:tcPr/>
+                </a:tc>
+                <a:tc>
+                  <a:txBody>
+                    <a:bodyPr/>
+                    <a:lstStyle/>
+                    <a:p>
+                      <a:r>
+                        <a:rPr lang="en-US" dirty="0" smtClean="0"/>
+                        <a:t>{{cell4.2}}</a:t>
+                      </a:r>
+                      <a:endParaRPr lang="fr-FR" dirty="0"/>
                     </a:p>
                   </a:txBody>
                   <a:tcPr/>
@@ -3366,8 +3451,12 @@
                     <a:lstStyle/>
                     <a:p>
                       <a:r>
-                        <a:rPr lang="en-US" smtClean="0"/>
-                        <a:t>cell4</a:t>
+                        <a:rPr lang="en-US" dirty="0" smtClean="0"/>
+                        <a:t>{{</a:t>
+                      </a:r>
+                      <a:r>
+                        <a:rPr lang="en-US" dirty="0" smtClean="0"/>
+                        <a:t>cell0.3}}</a:t>
                       </a:r>
                       <a:endParaRPr lang="fr-FR" dirty="0"/>
                     </a:p>
@@ -3393,27 +3482,39 @@
                     <a:bodyPr/>
                     <a:lstStyle/>
                     <a:p>
-                      <a:endParaRPr lang="fr-FR"/>
-                    </a:p>
-                  </a:txBody>
-                  <a:tcPr/>
-                </a:tc>
-                <a:tc>
-                  <a:txBody>
-                    <a:bodyPr/>
-                    <a:lstStyle/>
-                    <a:p>
-                      <a:endParaRPr lang="fr-FR"/>
-                    </a:p>
-                  </a:txBody>
-                  <a:tcPr/>
-                </a:tc>
-                <a:tc>
-                  <a:txBody>
-                    <a:bodyPr/>
-                    <a:lstStyle/>
-                    <a:p>
-                      <a:endParaRPr lang="fr-FR"/>
+                      <a:r>
+                        <a:rPr lang="en-US" dirty="0" smtClean="0"/>
+                        <a:t>{{cell2.3}}</a:t>
+                      </a:r>
+                      <a:endParaRPr lang="fr-FR" dirty="0"/>
+                    </a:p>
+                  </a:txBody>
+                  <a:tcPr/>
+                </a:tc>
+                <a:tc>
+                  <a:txBody>
+                    <a:bodyPr/>
+                    <a:lstStyle/>
+                    <a:p>
+                      <a:r>
+                        <a:rPr lang="en-US" dirty="0" smtClean="0"/>
+                        <a:t>{{cell3.3}}</a:t>
+                      </a:r>
+                      <a:endParaRPr lang="fr-FR" dirty="0"/>
+                    </a:p>
+                  </a:txBody>
+                  <a:tcPr/>
+                </a:tc>
+                <a:tc>
+                  <a:txBody>
+                    <a:bodyPr/>
+                    <a:lstStyle/>
+                    <a:p>
+                      <a:r>
+                        <a:rPr lang="en-US" dirty="0" smtClean="0"/>
+                        <a:t>{{cell4.3}}</a:t>
+                      </a:r>
+                      <a:endParaRPr lang="fr-FR" dirty="0"/>
                     </a:p>
                   </a:txBody>
                   <a:tcPr/>
@@ -3427,7 +3528,7 @@
                     <a:p>
                       <a:r>
                         <a:rPr lang="en-US" dirty="0" smtClean="0"/>
-                        <a:t>Cell5</a:t>
+                        <a:t>{{cell0.4}}</a:t>
                       </a:r>
                       <a:endParaRPr lang="fr-FR" dirty="0"/>
                     </a:p>
@@ -3453,27 +3554,39 @@
                     <a:bodyPr/>
                     <a:lstStyle/>
                     <a:p>
-                      <a:endParaRPr lang="fr-FR"/>
-                    </a:p>
-                  </a:txBody>
-                  <a:tcPr/>
-                </a:tc>
-                <a:tc>
-                  <a:txBody>
-                    <a:bodyPr/>
-                    <a:lstStyle/>
-                    <a:p>
-                      <a:endParaRPr lang="fr-FR"/>
-                    </a:p>
-                  </a:txBody>
-                  <a:tcPr/>
-                </a:tc>
-                <a:tc>
-                  <a:txBody>
-                    <a:bodyPr/>
-                    <a:lstStyle/>
-                    <a:p>
-                      <a:endParaRPr lang="fr-FR"/>
+                      <a:r>
+                        <a:rPr lang="en-US" dirty="0" smtClean="0"/>
+                        <a:t>{{cell2.4}}</a:t>
+                      </a:r>
+                      <a:endParaRPr lang="fr-FR" dirty="0"/>
+                    </a:p>
+                  </a:txBody>
+                  <a:tcPr/>
+                </a:tc>
+                <a:tc>
+                  <a:txBody>
+                    <a:bodyPr/>
+                    <a:lstStyle/>
+                    <a:p>
+                      <a:r>
+                        <a:rPr lang="en-US" dirty="0" smtClean="0"/>
+                        <a:t>{{cell3.4}}</a:t>
+                      </a:r>
+                      <a:endParaRPr lang="fr-FR" dirty="0"/>
+                    </a:p>
+                  </a:txBody>
+                  <a:tcPr/>
+                </a:tc>
+                <a:tc>
+                  <a:txBody>
+                    <a:bodyPr/>
+                    <a:lstStyle/>
+                    <a:p>
+                      <a:r>
+                        <a:rPr lang="en-US" dirty="0" smtClean="0"/>
+                        <a:t>{{cell4.4}}</a:t>
+                      </a:r>
+                      <a:endParaRPr lang="fr-FR" dirty="0"/>
                     </a:p>
                   </a:txBody>
                   <a:tcPr/>
@@ -3487,7 +3600,11 @@
                     <a:p>
                       <a:r>
                         <a:rPr lang="en-US" dirty="0" smtClean="0"/>
-                        <a:t>Cell6</a:t>
+                        <a:t>{{</a:t>
+                      </a:r>
+                      <a:r>
+                        <a:rPr lang="en-US" dirty="0" smtClean="0"/>
+                        <a:t>cell0.5}}</a:t>
                       </a:r>
                       <a:endParaRPr lang="fr-FR" dirty="0"/>
                     </a:p>
@@ -3513,27 +3630,39 @@
                     <a:bodyPr/>
                     <a:lstStyle/>
                     <a:p>
-                      <a:endParaRPr lang="fr-FR"/>
-                    </a:p>
-                  </a:txBody>
-                  <a:tcPr/>
-                </a:tc>
-                <a:tc>
-                  <a:txBody>
-                    <a:bodyPr/>
-                    <a:lstStyle/>
-                    <a:p>
-                      <a:endParaRPr lang="fr-FR"/>
-                    </a:p>
-                  </a:txBody>
-                  <a:tcPr/>
-                </a:tc>
-                <a:tc>
-                  <a:txBody>
-                    <a:bodyPr/>
-                    <a:lstStyle/>
-                    <a:p>
-                      <a:endParaRPr lang="fr-FR"/>
+                      <a:r>
+                        <a:rPr lang="en-US" dirty="0" smtClean="0"/>
+                        <a:t>{{cell2.5}}</a:t>
+                      </a:r>
+                      <a:endParaRPr lang="fr-FR" dirty="0"/>
+                    </a:p>
+                  </a:txBody>
+                  <a:tcPr/>
+                </a:tc>
+                <a:tc>
+                  <a:txBody>
+                    <a:bodyPr/>
+                    <a:lstStyle/>
+                    <a:p>
+                      <a:r>
+                        <a:rPr lang="en-US" dirty="0" smtClean="0"/>
+                        <a:t>{{cell3.5}}</a:t>
+                      </a:r>
+                      <a:endParaRPr lang="fr-FR" dirty="0"/>
+                    </a:p>
+                  </a:txBody>
+                  <a:tcPr/>
+                </a:tc>
+                <a:tc>
+                  <a:txBody>
+                    <a:bodyPr/>
+                    <a:lstStyle/>
+                    <a:p>
+                      <a:r>
+                        <a:rPr lang="en-US" dirty="0" smtClean="0"/>
+                        <a:t>{{cell4.5}}</a:t>
+                      </a:r>
+                      <a:endParaRPr lang="fr-FR" dirty="0"/>
                     </a:p>
                   </a:txBody>
                   <a:tcPr/>
@@ -3547,7 +3676,11 @@
                     <a:p>
                       <a:r>
                         <a:rPr lang="en-US" dirty="0" smtClean="0"/>
-                        <a:t>Cell7</a:t>
+                        <a:t>{{</a:t>
+                      </a:r>
+                      <a:r>
+                        <a:rPr lang="en-US" dirty="0" smtClean="0"/>
+                        <a:t>cell0.6}}</a:t>
                       </a:r>
                       <a:endParaRPr lang="fr-FR" dirty="0"/>
                     </a:p>
@@ -3573,27 +3706,39 @@
                     <a:bodyPr/>
                     <a:lstStyle/>
                     <a:p>
-                      <a:endParaRPr lang="fr-FR"/>
-                    </a:p>
-                  </a:txBody>
-                  <a:tcPr/>
-                </a:tc>
-                <a:tc>
-                  <a:txBody>
-                    <a:bodyPr/>
-                    <a:lstStyle/>
-                    <a:p>
-                      <a:endParaRPr lang="fr-FR"/>
-                    </a:p>
-                  </a:txBody>
-                  <a:tcPr/>
-                </a:tc>
-                <a:tc>
-                  <a:txBody>
-                    <a:bodyPr/>
-                    <a:lstStyle/>
-                    <a:p>
-                      <a:endParaRPr lang="fr-FR"/>
+                      <a:r>
+                        <a:rPr lang="en-US" dirty="0" smtClean="0"/>
+                        <a:t>{{cell2.6}}</a:t>
+                      </a:r>
+                      <a:endParaRPr lang="fr-FR" dirty="0"/>
+                    </a:p>
+                  </a:txBody>
+                  <a:tcPr/>
+                </a:tc>
+                <a:tc>
+                  <a:txBody>
+                    <a:bodyPr/>
+                    <a:lstStyle/>
+                    <a:p>
+                      <a:r>
+                        <a:rPr lang="en-US" dirty="0" smtClean="0"/>
+                        <a:t>{{cell3.6}}</a:t>
+                      </a:r>
+                      <a:endParaRPr lang="fr-FR" dirty="0"/>
+                    </a:p>
+                  </a:txBody>
+                  <a:tcPr/>
+                </a:tc>
+                <a:tc>
+                  <a:txBody>
+                    <a:bodyPr/>
+                    <a:lstStyle/>
+                    <a:p>
+                      <a:r>
+                        <a:rPr lang="en-US" dirty="0" smtClean="0"/>
+                        <a:t>{{cell4.6}}</a:t>
+                      </a:r>
+                      <a:endParaRPr lang="fr-FR" dirty="0"/>
                     </a:p>
                   </a:txBody>
                   <a:tcPr/>
@@ -3607,8 +3752,13 @@
                     <a:p>
                       <a:r>
                         <a:rPr lang="en-US" dirty="0" smtClean="0"/>
-                        <a:t>Cell8</a:t>
-                      </a:r>
+                        <a:t>{{</a:t>
+                      </a:r>
+                      <a:r>
+                        <a:rPr lang="en-US" dirty="0" smtClean="0"/>
+                        <a:t>cell0.7}}</a:t>
+                      </a:r>
+                      <a:endParaRPr lang="en-US" dirty="0" smtClean="0"/>
                     </a:p>
                   </a:txBody>
                   <a:tcPr/>
@@ -3632,27 +3782,39 @@
                     <a:bodyPr/>
                     <a:lstStyle/>
                     <a:p>
-                      <a:endParaRPr lang="fr-FR"/>
-                    </a:p>
-                  </a:txBody>
-                  <a:tcPr/>
-                </a:tc>
-                <a:tc>
-                  <a:txBody>
-                    <a:bodyPr/>
-                    <a:lstStyle/>
-                    <a:p>
-                      <a:endParaRPr lang="fr-FR"/>
-                    </a:p>
-                  </a:txBody>
-                  <a:tcPr/>
-                </a:tc>
-                <a:tc>
-                  <a:txBody>
-                    <a:bodyPr/>
-                    <a:lstStyle/>
-                    <a:p>
-                      <a:endParaRPr lang="fr-FR"/>
+                      <a:r>
+                        <a:rPr lang="en-US" dirty="0" smtClean="0"/>
+                        <a:t>{{cell2.7}}</a:t>
+                      </a:r>
+                      <a:endParaRPr lang="fr-FR" dirty="0"/>
+                    </a:p>
+                  </a:txBody>
+                  <a:tcPr/>
+                </a:tc>
+                <a:tc>
+                  <a:txBody>
+                    <a:bodyPr/>
+                    <a:lstStyle/>
+                    <a:p>
+                      <a:r>
+                        <a:rPr lang="en-US" dirty="0" smtClean="0"/>
+                        <a:t>{{cell3.7}}</a:t>
+                      </a:r>
+                      <a:endParaRPr lang="fr-FR" dirty="0"/>
+                    </a:p>
+                  </a:txBody>
+                  <a:tcPr/>
+                </a:tc>
+                <a:tc>
+                  <a:txBody>
+                    <a:bodyPr/>
+                    <a:lstStyle/>
+                    <a:p>
+                      <a:r>
+                        <a:rPr lang="en-US" dirty="0" smtClean="0"/>
+                        <a:t>{{cell4.7}}</a:t>
+                      </a:r>
+                      <a:endParaRPr lang="fr-FR" dirty="0"/>
                     </a:p>
                   </a:txBody>
                   <a:tcPr/>
@@ -3664,10 +3826,6 @@
                     <a:bodyPr/>
                     <a:lstStyle/>
                     <a:p>
-                      <a:r>
-                        <a:rPr lang="en-US" dirty="0" smtClean="0"/>
-                        <a:t>Cell9</a:t>
-                      </a:r>
                       <a:endParaRPr lang="fr-FR" dirty="0"/>
                     </a:p>
                   </a:txBody>
@@ -3692,7 +3850,7 @@
                     <a:bodyPr/>
                     <a:lstStyle/>
                     <a:p>
-                      <a:endParaRPr lang="fr-FR"/>
+                      <a:endParaRPr lang="fr-FR" dirty="0"/>
                     </a:p>
                   </a:txBody>
                   <a:tcPr/>

</xml_diff>

<commit_message>
Change the algorithm to replace cells inside tables
</commit_message>
<xml_diff>
--- a/PptxTemplater.Tests/files/SetTableCellBackgroundPicture.pptx
+++ b/PptxTemplater.Tests/files/SetTableCellBackgroundPicture.pptx
@@ -288,7 +288,7 @@
           <a:p>
             <a:fld id="{D06E67F7-FBAE-42BC-AFE2-4FDDC8302DDB}" type="datetimeFigureOut">
               <a:rPr lang="fr-FR" smtClean="0"/>
-              <a:t>17/10/2012</a:t>
+              <a:t>29/11/2012</a:t>
             </a:fld>
             <a:endParaRPr lang="fr-FR"/>
           </a:p>
@@ -458,7 +458,7 @@
           <a:p>
             <a:fld id="{D06E67F7-FBAE-42BC-AFE2-4FDDC8302DDB}" type="datetimeFigureOut">
               <a:rPr lang="fr-FR" smtClean="0"/>
-              <a:t>17/10/2012</a:t>
+              <a:t>29/11/2012</a:t>
             </a:fld>
             <a:endParaRPr lang="fr-FR"/>
           </a:p>
@@ -638,7 +638,7 @@
           <a:p>
             <a:fld id="{D06E67F7-FBAE-42BC-AFE2-4FDDC8302DDB}" type="datetimeFigureOut">
               <a:rPr lang="fr-FR" smtClean="0"/>
-              <a:t>17/10/2012</a:t>
+              <a:t>29/11/2012</a:t>
             </a:fld>
             <a:endParaRPr lang="fr-FR"/>
           </a:p>
@@ -808,7 +808,7 @@
           <a:p>
             <a:fld id="{D06E67F7-FBAE-42BC-AFE2-4FDDC8302DDB}" type="datetimeFigureOut">
               <a:rPr lang="fr-FR" smtClean="0"/>
-              <a:t>17/10/2012</a:t>
+              <a:t>29/11/2012</a:t>
             </a:fld>
             <a:endParaRPr lang="fr-FR"/>
           </a:p>
@@ -1054,7 +1054,7 @@
           <a:p>
             <a:fld id="{D06E67F7-FBAE-42BC-AFE2-4FDDC8302DDB}" type="datetimeFigureOut">
               <a:rPr lang="fr-FR" smtClean="0"/>
-              <a:t>17/10/2012</a:t>
+              <a:t>29/11/2012</a:t>
             </a:fld>
             <a:endParaRPr lang="fr-FR"/>
           </a:p>
@@ -1342,7 +1342,7 @@
           <a:p>
             <a:fld id="{D06E67F7-FBAE-42BC-AFE2-4FDDC8302DDB}" type="datetimeFigureOut">
               <a:rPr lang="fr-FR" smtClean="0"/>
-              <a:t>17/10/2012</a:t>
+              <a:t>29/11/2012</a:t>
             </a:fld>
             <a:endParaRPr lang="fr-FR"/>
           </a:p>
@@ -1764,7 +1764,7 @@
           <a:p>
             <a:fld id="{D06E67F7-FBAE-42BC-AFE2-4FDDC8302DDB}" type="datetimeFigureOut">
               <a:rPr lang="fr-FR" smtClean="0"/>
-              <a:t>17/10/2012</a:t>
+              <a:t>29/11/2012</a:t>
             </a:fld>
             <a:endParaRPr lang="fr-FR"/>
           </a:p>
@@ -1882,7 +1882,7 @@
           <a:p>
             <a:fld id="{D06E67F7-FBAE-42BC-AFE2-4FDDC8302DDB}" type="datetimeFigureOut">
               <a:rPr lang="fr-FR" smtClean="0"/>
-              <a:t>17/10/2012</a:t>
+              <a:t>29/11/2012</a:t>
             </a:fld>
             <a:endParaRPr lang="fr-FR"/>
           </a:p>
@@ -1977,7 +1977,7 @@
           <a:p>
             <a:fld id="{D06E67F7-FBAE-42BC-AFE2-4FDDC8302DDB}" type="datetimeFigureOut">
               <a:rPr lang="fr-FR" smtClean="0"/>
-              <a:t>17/10/2012</a:t>
+              <a:t>29/11/2012</a:t>
             </a:fld>
             <a:endParaRPr lang="fr-FR"/>
           </a:p>
@@ -2254,7 +2254,7 @@
           <a:p>
             <a:fld id="{D06E67F7-FBAE-42BC-AFE2-4FDDC8302DDB}" type="datetimeFigureOut">
               <a:rPr lang="fr-FR" smtClean="0"/>
-              <a:t>17/10/2012</a:t>
+              <a:t>29/11/2012</a:t>
             </a:fld>
             <a:endParaRPr lang="fr-FR"/>
           </a:p>
@@ -2507,7 +2507,7 @@
           <a:p>
             <a:fld id="{D06E67F7-FBAE-42BC-AFE2-4FDDC8302DDB}" type="datetimeFigureOut">
               <a:rPr lang="fr-FR" smtClean="0"/>
-              <a:t>17/10/2012</a:t>
+              <a:t>29/11/2012</a:t>
             </a:fld>
             <a:endParaRPr lang="fr-FR"/>
           </a:p>
@@ -2720,7 +2720,7 @@
           <a:p>
             <a:fld id="{D06E67F7-FBAE-42BC-AFE2-4FDDC8302DDB}" type="datetimeFigureOut">
               <a:rPr lang="fr-FR" smtClean="0"/>
-              <a:t>17/10/2012</a:t>
+              <a:t>29/11/2012</a:t>
             </a:fld>
             <a:endParaRPr lang="fr-FR"/>
           </a:p>
@@ -3105,13 +3105,13 @@
             <p:ph idx="1"/>
             <p:extLst>
               <p:ext uri="{D42A27DB-BD31-4B8C-83A1-F6EECF244321}">
-                <p14:modId xmlns:p14="http://schemas.microsoft.com/office/powerpoint/2010/main" val="2421292337"/>
+                <p14:modId xmlns:p14="http://schemas.microsoft.com/office/powerpoint/2010/main" val="3788465925"/>
               </p:ext>
             </p:extLst>
           </p:nvPr>
         </p:nvGraphicFramePr>
         <p:xfrm>
-          <a:off x="457200" y="404664"/>
+          <a:off x="457200" y="1304776"/>
           <a:ext cx="8229600" cy="3708400"/>
         </p:xfrm>
         <a:graphic>
@@ -3826,126 +3826,6 @@
                   </a:txBody>
                   <a:tcPr/>
                 </a:tc>
-                <a:tc>
-                  <a:txBody>
-                    <a:bodyPr/>
-                    <a:lstStyle/>
-                    <a:p>
-                      <a:endParaRPr lang="fr-FR"/>
-                    </a:p>
-                  </a:txBody>
-                  <a:tcPr/>
-                </a:tc>
-                <a:tc>
-                  <a:txBody>
-                    <a:bodyPr/>
-                    <a:lstStyle/>
-                    <a:p>
-                      <a:endParaRPr lang="fr-FR" dirty="0"/>
-                    </a:p>
-                  </a:txBody>
-                  <a:tcPr/>
-                </a:tc>
-              </a:tr>
-            </a:tbl>
-          </a:graphicData>
-        </a:graphic>
-      </p:graphicFrame>
-      <p:graphicFrame>
-        <p:nvGraphicFramePr>
-          <p:cNvPr id="2" name="Table 1" title="{{table2}}"/>
-          <p:cNvGraphicFramePr>
-            <a:graphicFrameLocks noGrp="1"/>
-          </p:cNvGraphicFramePr>
-          <p:nvPr>
-            <p:extLst>
-              <p:ext uri="{D42A27DB-BD31-4B8C-83A1-F6EECF244321}">
-                <p14:modId xmlns:p14="http://schemas.microsoft.com/office/powerpoint/2010/main" val="3136210444"/>
-              </p:ext>
-            </p:extLst>
-          </p:nvPr>
-        </p:nvGraphicFramePr>
-        <p:xfrm>
-          <a:off x="1475656" y="5013176"/>
-          <a:ext cx="6096000" cy="1483360"/>
-        </p:xfrm>
-        <a:graphic>
-          <a:graphicData uri="http://schemas.openxmlformats.org/drawingml/2006/table">
-            <a:tbl>
-              <a:tblPr firstRow="1" bandRow="1">
-                <a:tableStyleId>{5C22544A-7EE6-4342-B048-85BDC9FD1C3A}</a:tableStyleId>
-              </a:tblPr>
-              <a:tblGrid>
-                <a:gridCol w="3048000"/>
-                <a:gridCol w="3048000"/>
-              </a:tblGrid>
-              <a:tr h="370840">
-                <a:tc>
-                  <a:txBody>
-                    <a:bodyPr/>
-                    <a:lstStyle/>
-                    <a:p>
-                      <a:endParaRPr lang="fr-FR" dirty="0"/>
-                    </a:p>
-                  </a:txBody>
-                  <a:tcPr/>
-                </a:tc>
-                <a:tc>
-                  <a:txBody>
-                    <a:bodyPr/>
-                    <a:lstStyle/>
-                    <a:p>
-                      <a:endParaRPr lang="fr-FR" dirty="0"/>
-                    </a:p>
-                  </a:txBody>
-                  <a:tcPr/>
-                </a:tc>
-              </a:tr>
-              <a:tr h="370840">
-                <a:tc>
-                  <a:txBody>
-                    <a:bodyPr/>
-                    <a:lstStyle/>
-                    <a:p>
-                      <a:endParaRPr lang="fr-FR"/>
-                    </a:p>
-                  </a:txBody>
-                  <a:tcPr/>
-                </a:tc>
-                <a:tc>
-                  <a:txBody>
-                    <a:bodyPr/>
-                    <a:lstStyle/>
-                    <a:p>
-                      <a:endParaRPr lang="fr-FR"/>
-                    </a:p>
-                  </a:txBody>
-                  <a:tcPr/>
-                </a:tc>
-              </a:tr>
-              <a:tr h="370840">
-                <a:tc>
-                  <a:txBody>
-                    <a:bodyPr/>
-                    <a:lstStyle/>
-                    <a:p>
-                      <a:endParaRPr lang="fr-FR"/>
-                    </a:p>
-                  </a:txBody>
-                  <a:tcPr/>
-                </a:tc>
-                <a:tc>
-                  <a:txBody>
-                    <a:bodyPr/>
-                    <a:lstStyle/>
-                    <a:p>
-                      <a:endParaRPr lang="fr-FR"/>
-                    </a:p>
-                  </a:txBody>
-                  <a:tcPr/>
-                </a:tc>
-              </a:tr>
-              <a:tr h="370840">
                 <a:tc>
                   <a:txBody>
                     <a:bodyPr/>

</xml_diff>